<commit_message>
Update OOP sample final tests
</commit_message>
<xml_diff>
--- a/CS4273-Introduce to Software Engineering/Lab 0. Introduction.pptx
+++ b/CS4273-Introduce to Software Engineering/Lab 0. Introduction.pptx
@@ -205,7 +205,7 @@
           <a:p>
             <a:fld id="{4455D742-84C4-4986-A84B-DC3E04175793}" type="datetimeFigureOut">
               <a:rPr lang="vi-VN" smtClean="0"/>
-              <a:t>28/10/2021</a:t>
+              <a:t>18/05/2022</a:t>
             </a:fld>
             <a:endParaRPr lang="vi-VN"/>
           </a:p>
@@ -601,7 +601,7 @@
           <a:p>
             <a:fld id="{837324BC-BCC2-4BAD-A06B-AAD059CC69DE}" type="datetime1">
               <a:rPr lang="en-US" smtClean="0"/>
-              <a:t>10/28/2021</a:t>
+              <a:t>5/18/2022</a:t>
             </a:fld>
             <a:endParaRPr lang="en-US"/>
           </a:p>
@@ -769,7 +769,7 @@
           <a:p>
             <a:fld id="{D81594A2-C23B-45FC-A4C9-E8DD448DD7B8}" type="datetime1">
               <a:rPr lang="en-US" smtClean="0"/>
-              <a:t>10/28/2021</a:t>
+              <a:t>5/18/2022</a:t>
             </a:fld>
             <a:endParaRPr lang="en-US"/>
           </a:p>
@@ -947,7 +947,7 @@
           <a:p>
             <a:fld id="{6144CD16-D323-46F5-95E5-AFA80E4E6C4D}" type="datetime1">
               <a:rPr lang="en-US" smtClean="0"/>
-              <a:t>10/28/2021</a:t>
+              <a:t>5/18/2022</a:t>
             </a:fld>
             <a:endParaRPr lang="en-US"/>
           </a:p>
@@ -1115,7 +1115,7 @@
           <a:p>
             <a:fld id="{7A16F03A-F89A-41E0-8A0F-867B43C91033}" type="datetime1">
               <a:rPr lang="en-US" smtClean="0"/>
-              <a:t>10/28/2021</a:t>
+              <a:t>5/18/2022</a:t>
             </a:fld>
             <a:endParaRPr lang="en-US"/>
           </a:p>
@@ -1360,7 +1360,7 @@
           <a:p>
             <a:fld id="{D4087027-130F-47B2-A872-AE2A2F443AEB}" type="datetime1">
               <a:rPr lang="en-US" smtClean="0"/>
-              <a:t>10/28/2021</a:t>
+              <a:t>5/18/2022</a:t>
             </a:fld>
             <a:endParaRPr lang="en-US"/>
           </a:p>
@@ -1589,7 +1589,7 @@
           <a:p>
             <a:fld id="{69059E1C-453D-4B97-A122-1BBC1BD3C80F}" type="datetime1">
               <a:rPr lang="en-US" smtClean="0"/>
-              <a:t>10/28/2021</a:t>
+              <a:t>5/18/2022</a:t>
             </a:fld>
             <a:endParaRPr lang="en-US"/>
           </a:p>
@@ -1953,7 +1953,7 @@
           <a:p>
             <a:fld id="{1BFCF4C4-F4C1-456E-80F7-B84FD9C9A251}" type="datetime1">
               <a:rPr lang="en-US" smtClean="0"/>
-              <a:t>10/28/2021</a:t>
+              <a:t>5/18/2022</a:t>
             </a:fld>
             <a:endParaRPr lang="en-US"/>
           </a:p>
@@ -2070,7 +2070,7 @@
           <a:p>
             <a:fld id="{BA8E2057-8843-40FC-89F4-BCAB84D62AE4}" type="datetime1">
               <a:rPr lang="en-US" smtClean="0"/>
-              <a:t>10/28/2021</a:t>
+              <a:t>5/18/2022</a:t>
             </a:fld>
             <a:endParaRPr lang="en-US"/>
           </a:p>
@@ -2165,7 +2165,7 @@
           <a:p>
             <a:fld id="{087DBD45-D533-438B-AF3B-44AC7A16A9EB}" type="datetime1">
               <a:rPr lang="en-US" smtClean="0"/>
-              <a:t>10/28/2021</a:t>
+              <a:t>5/18/2022</a:t>
             </a:fld>
             <a:endParaRPr lang="en-US"/>
           </a:p>
@@ -2440,7 +2440,7 @@
           <a:p>
             <a:fld id="{0D83E530-2BF5-4B8E-9F51-B07667E1021A}" type="datetime1">
               <a:rPr lang="en-US" smtClean="0"/>
-              <a:t>10/28/2021</a:t>
+              <a:t>5/18/2022</a:t>
             </a:fld>
             <a:endParaRPr lang="en-US"/>
           </a:p>
@@ -2692,7 +2692,7 @@
           <a:p>
             <a:fld id="{4F50772C-2FA7-4C75-BDD4-D2F8B54F9662}" type="datetime1">
               <a:rPr lang="en-US" smtClean="0"/>
-              <a:t>10/28/2021</a:t>
+              <a:t>5/18/2022</a:t>
             </a:fld>
             <a:endParaRPr lang="en-US"/>
           </a:p>
@@ -2903,7 +2903,7 @@
           <a:p>
             <a:fld id="{E85DDE86-662E-4F31-A7F9-80320A031D92}" type="datetime1">
               <a:rPr lang="en-US" smtClean="0"/>
-              <a:t>10/28/2021</a:t>
+              <a:t>5/18/2022</a:t>
             </a:fld>
             <a:endParaRPr lang="en-US"/>
           </a:p>
@@ -3373,15 +3373,8 @@
             <a:pPr algn="l"/>
             <a:r>
               <a:rPr lang="en-US"/>
-              <a:t>Email: </a:t>
-            </a:r>
-            <a:r>
-              <a:rPr lang="en-US">
-                <a:hlinkClick r:id="rId2"/>
-              </a:rPr>
-              <a:t>17520433@gm.uit.edu.vn</a:t>
-            </a:r>
-            <a:endParaRPr lang="en-US"/>
+              <a:t>Email: haivt@uit.edu.vn</a:t>
+            </a:r>
           </a:p>
           <a:p>
             <a:pPr algn="l"/>

</xml_diff>